<commit_message>
Update the code for the first draft so far
</commit_message>
<xml_diff>
--- a/docs/workflow.pptx
+++ b/docs/workflow.pptx
@@ -197,7 +197,7 @@
           <a:p>
             <a:fld id="{2DBCD057-0A51-7345-8119-29F2296C56CA}" type="datetimeFigureOut">
               <a:rPr lang="en-US" smtClean="0"/>
-              <a:t>10/7/22</a:t>
+              <a:t>12/21/22</a:t>
             </a:fld>
             <a:endParaRPr lang="en-US"/>
           </a:p>
@@ -695,7 +695,7 @@
           <a:p>
             <a:fld id="{E13A7426-5351-0B4A-B484-D341EC6D7F11}" type="datetimeFigureOut">
               <a:rPr lang="en-US" smtClean="0"/>
-              <a:t>10/7/22</a:t>
+              <a:t>12/21/22</a:t>
             </a:fld>
             <a:endParaRPr lang="en-US"/>
           </a:p>
@@ -893,7 +893,7 @@
           <a:p>
             <a:fld id="{E13A7426-5351-0B4A-B484-D341EC6D7F11}" type="datetimeFigureOut">
               <a:rPr lang="en-US" smtClean="0"/>
-              <a:t>10/7/22</a:t>
+              <a:t>12/21/22</a:t>
             </a:fld>
             <a:endParaRPr lang="en-US"/>
           </a:p>
@@ -1101,7 +1101,7 @@
           <a:p>
             <a:fld id="{E13A7426-5351-0B4A-B484-D341EC6D7F11}" type="datetimeFigureOut">
               <a:rPr lang="en-US" smtClean="0"/>
-              <a:t>10/7/22</a:t>
+              <a:t>12/21/22</a:t>
             </a:fld>
             <a:endParaRPr lang="en-US"/>
           </a:p>
@@ -1299,7 +1299,7 @@
           <a:p>
             <a:fld id="{E13A7426-5351-0B4A-B484-D341EC6D7F11}" type="datetimeFigureOut">
               <a:rPr lang="en-US" smtClean="0"/>
-              <a:t>10/7/22</a:t>
+              <a:t>12/21/22</a:t>
             </a:fld>
             <a:endParaRPr lang="en-US"/>
           </a:p>
@@ -1574,7 +1574,7 @@
           <a:p>
             <a:fld id="{E13A7426-5351-0B4A-B484-D341EC6D7F11}" type="datetimeFigureOut">
               <a:rPr lang="en-US" smtClean="0"/>
-              <a:t>10/7/22</a:t>
+              <a:t>12/21/22</a:t>
             </a:fld>
             <a:endParaRPr lang="en-US"/>
           </a:p>
@@ -1839,7 +1839,7 @@
           <a:p>
             <a:fld id="{E13A7426-5351-0B4A-B484-D341EC6D7F11}" type="datetimeFigureOut">
               <a:rPr lang="en-US" smtClean="0"/>
-              <a:t>10/7/22</a:t>
+              <a:t>12/21/22</a:t>
             </a:fld>
             <a:endParaRPr lang="en-US"/>
           </a:p>
@@ -2251,7 +2251,7 @@
           <a:p>
             <a:fld id="{E13A7426-5351-0B4A-B484-D341EC6D7F11}" type="datetimeFigureOut">
               <a:rPr lang="en-US" smtClean="0"/>
-              <a:t>10/7/22</a:t>
+              <a:t>12/21/22</a:t>
             </a:fld>
             <a:endParaRPr lang="en-US"/>
           </a:p>
@@ -2392,7 +2392,7 @@
           <a:p>
             <a:fld id="{E13A7426-5351-0B4A-B484-D341EC6D7F11}" type="datetimeFigureOut">
               <a:rPr lang="en-US" smtClean="0"/>
-              <a:t>10/7/22</a:t>
+              <a:t>12/21/22</a:t>
             </a:fld>
             <a:endParaRPr lang="en-US"/>
           </a:p>
@@ -2505,7 +2505,7 @@
           <a:p>
             <a:fld id="{E13A7426-5351-0B4A-B484-D341EC6D7F11}" type="datetimeFigureOut">
               <a:rPr lang="en-US" smtClean="0"/>
-              <a:t>10/7/22</a:t>
+              <a:t>12/21/22</a:t>
             </a:fld>
             <a:endParaRPr lang="en-US"/>
           </a:p>
@@ -2816,7 +2816,7 @@
           <a:p>
             <a:fld id="{E13A7426-5351-0B4A-B484-D341EC6D7F11}" type="datetimeFigureOut">
               <a:rPr lang="en-US" smtClean="0"/>
-              <a:t>10/7/22</a:t>
+              <a:t>12/21/22</a:t>
             </a:fld>
             <a:endParaRPr lang="en-US"/>
           </a:p>
@@ -3104,7 +3104,7 @@
           <a:p>
             <a:fld id="{E13A7426-5351-0B4A-B484-D341EC6D7F11}" type="datetimeFigureOut">
               <a:rPr lang="en-US" smtClean="0"/>
-              <a:t>10/7/22</a:t>
+              <a:t>12/21/22</a:t>
             </a:fld>
             <a:endParaRPr lang="en-US"/>
           </a:p>
@@ -3345,7 +3345,7 @@
           <a:p>
             <a:fld id="{E13A7426-5351-0B4A-B484-D341EC6D7F11}" type="datetimeFigureOut">
               <a:rPr lang="en-US" smtClean="0"/>
-              <a:t>10/7/22</a:t>
+              <a:t>12/21/22</a:t>
             </a:fld>
             <a:endParaRPr lang="en-US"/>
           </a:p>
@@ -4206,7 +4206,7 @@
             <a:pPr algn="ctr"/>
             <a:r>
               <a:rPr lang="en-US" sz="1400" dirty="0"/>
-              <a:t>4.7 m</a:t>
+              <a:t>4.77 m</a:t>
             </a:r>
           </a:p>
         </p:txBody>

</xml_diff>